<commit_message>
article progress plus references
</commit_message>
<xml_diff>
--- a/Shared_A01212611/Slides/GroupMeeting004_Pyrolysis_induced_shrinking.pptx
+++ b/Shared_A01212611/Slides/GroupMeeting004_Pyrolysis_induced_shrinking.pptx
@@ -5,7 +5,7 @@
     <p:sldMasterId id="2147483648" r:id="rId1"/>
   </p:sldMasterIdLst>
   <p:notesMasterIdLst>
-    <p:notesMasterId r:id="rId13"/>
+    <p:notesMasterId r:id="rId14"/>
   </p:notesMasterIdLst>
   <p:sldIdLst>
     <p:sldId id="256" r:id="rId2"/>
@@ -19,6 +19,7 @@
     <p:sldId id="276" r:id="rId10"/>
     <p:sldId id="269" r:id="rId11"/>
     <p:sldId id="263" r:id="rId12"/>
+    <p:sldId id="288" r:id="rId13"/>
   </p:sldIdLst>
   <p:sldSz cx="12192000" cy="6858000"/>
   <p:notesSz cx="6858000" cy="9144000"/>
@@ -149,6 +150,7 @@
         <p14:section name="Side Slides" id="{1C99C5B6-3640-4323-B416-8D531FACFE49}">
           <p14:sldIdLst>
             <p14:sldId id="263"/>
+            <p14:sldId id="288"/>
           </p14:sldIdLst>
         </p14:section>
       </p14:sectionLst>
@@ -2479,6 +2481,99 @@
 </p:notes>
 </file>
 
+<file path=ppt/notesSlides/notesSlide9.xml><?xml version="1.0" encoding="utf-8"?>
+<p:notes xmlns:a="http://schemas.openxmlformats.org/drawingml/2006/main" xmlns:r="http://schemas.openxmlformats.org/officeDocument/2006/relationships" xmlns:p="http://schemas.openxmlformats.org/presentationml/2006/main">
+  <p:cSld>
+    <p:spTree>
+      <p:nvGrpSpPr>
+        <p:cNvPr id="1" name=""/>
+        <p:cNvGrpSpPr/>
+        <p:nvPr/>
+      </p:nvGrpSpPr>
+      <p:grpSpPr>
+        <a:xfrm>
+          <a:off x="0" y="0"/>
+          <a:ext cx="0" cy="0"/>
+          <a:chOff x="0" y="0"/>
+          <a:chExt cx="0" cy="0"/>
+        </a:xfrm>
+      </p:grpSpPr>
+      <p:sp>
+        <p:nvSpPr>
+          <p:cNvPr id="2" name="Slide Image Placeholder 1"/>
+          <p:cNvSpPr>
+            <a:spLocks noGrp="1" noRot="1" noChangeAspect="1"/>
+          </p:cNvSpPr>
+          <p:nvPr>
+            <p:ph type="sldImg"/>
+          </p:nvPr>
+        </p:nvSpPr>
+        <p:spPr/>
+      </p:sp>
+      <p:sp>
+        <p:nvSpPr>
+          <p:cNvPr id="3" name="Notes Placeholder 2"/>
+          <p:cNvSpPr>
+            <a:spLocks noGrp="1"/>
+          </p:cNvSpPr>
+          <p:nvPr>
+            <p:ph type="body" idx="1"/>
+          </p:nvPr>
+        </p:nvSpPr>
+        <p:spPr/>
+        <p:txBody>
+          <a:bodyPr/>
+          <a:lstStyle/>
+          <a:p>
+            <a:r>
+              <a:rPr lang="en-GB" dirty="0">
+                <a:hlinkClick r:id="rId3"/>
+              </a:rPr>
+              <a:t>https://rsc.aux.eng.ufl.edu/_files/msds/309.pdf</a:t>
+            </a:r>
+            <a:endParaRPr lang="en-GB" dirty="0"/>
+          </a:p>
+          <a:p>
+            <a:endParaRPr lang="en-GB" dirty="0"/>
+          </a:p>
+        </p:txBody>
+      </p:sp>
+      <p:sp>
+        <p:nvSpPr>
+          <p:cNvPr id="4" name="Slide Number Placeholder 3"/>
+          <p:cNvSpPr>
+            <a:spLocks noGrp="1"/>
+          </p:cNvSpPr>
+          <p:nvPr>
+            <p:ph type="sldNum" sz="quarter" idx="5"/>
+          </p:nvPr>
+        </p:nvSpPr>
+        <p:spPr/>
+        <p:txBody>
+          <a:bodyPr/>
+          <a:lstStyle/>
+          <a:p>
+            <a:fld id="{B3A8F86A-A3D1-4706-9131-90E1724D7948}" type="slidenum">
+              <a:rPr lang="en-GB" smtClean="0"/>
+              <a:t>12</a:t>
+            </a:fld>
+            <a:endParaRPr lang="en-GB"/>
+          </a:p>
+        </p:txBody>
+      </p:sp>
+    </p:spTree>
+    <p:extLst>
+      <p:ext uri="{BB962C8B-B14F-4D97-AF65-F5344CB8AC3E}">
+        <p14:creationId xmlns:p14="http://schemas.microsoft.com/office/powerpoint/2010/main" val="2349086066"/>
+      </p:ext>
+    </p:extLst>
+  </p:cSld>
+  <p:clrMapOvr>
+    <a:masterClrMapping/>
+  </p:clrMapOvr>
+</p:notes>
+</file>
+
 <file path=ppt/slideLayouts/slideLayout1.xml><?xml version="1.0" encoding="utf-8"?>
 <p:sldLayout xmlns:a="http://schemas.openxmlformats.org/drawingml/2006/main" xmlns:r="http://schemas.openxmlformats.org/officeDocument/2006/relationships" xmlns:p="http://schemas.openxmlformats.org/presentationml/2006/main" type="title" preserve="1">
   <p:cSld name="Title Slide">
@@ -6462,6 +6557,576 @@
 </p:sld>
 </file>
 
+<file path=ppt/slides/slide12.xml><?xml version="1.0" encoding="utf-8"?>
+<p:sld xmlns:a="http://schemas.openxmlformats.org/drawingml/2006/main" xmlns:r="http://schemas.openxmlformats.org/officeDocument/2006/relationships" xmlns:p="http://schemas.openxmlformats.org/presentationml/2006/main">
+  <p:cSld>
+    <p:spTree>
+      <p:nvGrpSpPr>
+        <p:cNvPr id="1" name=""/>
+        <p:cNvGrpSpPr/>
+        <p:nvPr/>
+      </p:nvGrpSpPr>
+      <p:grpSpPr>
+        <a:xfrm>
+          <a:off x="0" y="0"/>
+          <a:ext cx="0" cy="0"/>
+          <a:chOff x="0" y="0"/>
+          <a:chExt cx="0" cy="0"/>
+        </a:xfrm>
+      </p:grpSpPr>
+      <p:grpSp>
+        <p:nvGrpSpPr>
+          <p:cNvPr id="3" name="Group 2">
+            <a:extLst>
+              <a:ext uri="{FF2B5EF4-FFF2-40B4-BE49-F238E27FC236}">
+                <a16:creationId xmlns:a16="http://schemas.microsoft.com/office/drawing/2014/main" id="{35803534-FEC8-493E-82C2-EEE7148E85CA}"/>
+              </a:ext>
+            </a:extLst>
+          </p:cNvPr>
+          <p:cNvGrpSpPr/>
+          <p:nvPr/>
+        </p:nvGrpSpPr>
+        <p:grpSpPr>
+          <a:xfrm>
+            <a:off x="937911" y="0"/>
+            <a:ext cx="11254089" cy="6858000"/>
+            <a:chOff x="937911" y="0"/>
+            <a:chExt cx="11254089" cy="6858000"/>
+          </a:xfrm>
+        </p:grpSpPr>
+        <p:grpSp>
+          <p:nvGrpSpPr>
+            <p:cNvPr id="11" name="Group 10">
+              <a:extLst>
+                <a:ext uri="{FF2B5EF4-FFF2-40B4-BE49-F238E27FC236}">
+                  <a16:creationId xmlns:a16="http://schemas.microsoft.com/office/drawing/2014/main" id="{3FBC5423-B427-493F-9270-155D9D48A767}"/>
+                </a:ext>
+              </a:extLst>
+            </p:cNvPr>
+            <p:cNvGrpSpPr/>
+            <p:nvPr/>
+          </p:nvGrpSpPr>
+          <p:grpSpPr>
+            <a:xfrm>
+              <a:off x="937913" y="0"/>
+              <a:ext cx="5121288" cy="3310772"/>
+              <a:chOff x="-542545" y="879490"/>
+              <a:chExt cx="3819145" cy="2468972"/>
+            </a:xfrm>
+          </p:grpSpPr>
+          <p:pic>
+            <p:nvPicPr>
+              <p:cNvPr id="5" name="Picture 4">
+                <a:extLst>
+                  <a:ext uri="{FF2B5EF4-FFF2-40B4-BE49-F238E27FC236}">
+                    <a16:creationId xmlns:a16="http://schemas.microsoft.com/office/drawing/2014/main" id="{27FA082B-E21B-40BD-92CA-B2224F3E0B3B}"/>
+                  </a:ext>
+                </a:extLst>
+              </p:cNvPr>
+              <p:cNvPicPr>
+                <a:picLocks noChangeAspect="1"/>
+              </p:cNvPicPr>
+              <p:nvPr/>
+            </p:nvPicPr>
+            <p:blipFill rotWithShape="1">
+              <a:blip r:embed="rId3"/>
+              <a:srcRect r="34033" b="50351"/>
+              <a:stretch/>
+            </p:blipFill>
+            <p:spPr>
+              <a:xfrm>
+                <a:off x="-542545" y="879490"/>
+                <a:ext cx="3819145" cy="916653"/>
+              </a:xfrm>
+              <a:prstGeom prst="rect">
+                <a:avLst/>
+              </a:prstGeom>
+            </p:spPr>
+          </p:pic>
+          <p:pic>
+            <p:nvPicPr>
+              <p:cNvPr id="9" name="Picture 8">
+                <a:extLst>
+                  <a:ext uri="{FF2B5EF4-FFF2-40B4-BE49-F238E27FC236}">
+                    <a16:creationId xmlns:a16="http://schemas.microsoft.com/office/drawing/2014/main" id="{707C59F7-2CD8-464D-82C0-34ABC93FF0DF}"/>
+                  </a:ext>
+                </a:extLst>
+              </p:cNvPr>
+              <p:cNvPicPr>
+                <a:picLocks noChangeAspect="1"/>
+              </p:cNvPicPr>
+              <p:nvPr/>
+            </p:nvPicPr>
+            <p:blipFill rotWithShape="1">
+              <a:blip r:embed="rId3"/>
+              <a:srcRect l="68412" b="15921"/>
+              <a:stretch/>
+            </p:blipFill>
+            <p:spPr>
+              <a:xfrm>
+                <a:off x="1447800" y="1796143"/>
+                <a:ext cx="1828800" cy="1552318"/>
+              </a:xfrm>
+              <a:prstGeom prst="rect">
+                <a:avLst/>
+              </a:prstGeom>
+            </p:spPr>
+          </p:pic>
+          <p:sp>
+            <p:nvSpPr>
+              <p:cNvPr id="10" name="Rectangle 9">
+                <a:extLst>
+                  <a:ext uri="{FF2B5EF4-FFF2-40B4-BE49-F238E27FC236}">
+                    <a16:creationId xmlns:a16="http://schemas.microsoft.com/office/drawing/2014/main" id="{1EAE2D87-F999-43A5-8F32-5F5F0A13F233}"/>
+                  </a:ext>
+                </a:extLst>
+              </p:cNvPr>
+              <p:cNvSpPr/>
+              <p:nvPr/>
+            </p:nvSpPr>
+            <p:spPr>
+              <a:xfrm>
+                <a:off x="-542545" y="1796144"/>
+                <a:ext cx="1990345" cy="1552318"/>
+              </a:xfrm>
+              <a:prstGeom prst="rect">
+                <a:avLst/>
+              </a:prstGeom>
+              <a:solidFill>
+                <a:schemeClr val="bg1"/>
+              </a:solidFill>
+              <a:ln>
+                <a:noFill/>
+              </a:ln>
+            </p:spPr>
+            <p:style>
+              <a:lnRef idx="2">
+                <a:schemeClr val="accent1">
+                  <a:shade val="50000"/>
+                </a:schemeClr>
+              </a:lnRef>
+              <a:fillRef idx="1">
+                <a:schemeClr val="accent1"/>
+              </a:fillRef>
+              <a:effectRef idx="0">
+                <a:schemeClr val="accent1"/>
+              </a:effectRef>
+              <a:fontRef idx="minor">
+                <a:schemeClr val="lt1"/>
+              </a:fontRef>
+            </p:style>
+            <p:txBody>
+              <a:bodyPr rtlCol="0" anchor="ctr"/>
+              <a:lstStyle/>
+              <a:p>
+                <a:pPr algn="ctr"/>
+                <a:endParaRPr lang="en-GB"/>
+              </a:p>
+            </p:txBody>
+          </p:sp>
+        </p:grpSp>
+        <p:sp>
+          <p:nvSpPr>
+            <p:cNvPr id="12" name="Rectangle 11">
+              <a:extLst>
+                <a:ext uri="{FF2B5EF4-FFF2-40B4-BE49-F238E27FC236}">
+                  <a16:creationId xmlns:a16="http://schemas.microsoft.com/office/drawing/2014/main" id="{FB0E9267-2C23-48C8-9C95-FAE8FAAB0741}"/>
+                </a:ext>
+              </a:extLst>
+            </p:cNvPr>
+            <p:cNvSpPr/>
+            <p:nvPr/>
+          </p:nvSpPr>
+          <p:spPr>
+            <a:xfrm>
+              <a:off x="937913" y="3310770"/>
+              <a:ext cx="5121289" cy="430887"/>
+            </a:xfrm>
+            <a:prstGeom prst="rect">
+              <a:avLst/>
+            </a:prstGeom>
+          </p:spPr>
+          <p:txBody>
+            <a:bodyPr wrap="square">
+              <a:spAutoFit/>
+            </a:bodyPr>
+            <a:lstStyle/>
+            <a:p>
+              <a:r>
+                <a:rPr lang="en-GB" sz="1100" dirty="0">
+                  <a:solidFill>
+                    <a:schemeClr val="bg1">
+                      <a:lumMod val="95000"/>
+                    </a:schemeClr>
+                  </a:solidFill>
+                  <a:latin typeface="Arial Nova Light" panose="020B0304020202020204" pitchFamily="34" charset="0"/>
+                </a:rPr>
+                <a:t>https://www.fishersci.com/shop/products/NC0702370/nc0702370#?keyword=MICROCHEM+CORP+PHOTORESIST+SU-8</a:t>
+              </a:r>
+            </a:p>
+          </p:txBody>
+        </p:sp>
+        <p:pic>
+          <p:nvPicPr>
+            <p:cNvPr id="13" name="Picture 12">
+              <a:extLst>
+                <a:ext uri="{FF2B5EF4-FFF2-40B4-BE49-F238E27FC236}">
+                  <a16:creationId xmlns:a16="http://schemas.microsoft.com/office/drawing/2014/main" id="{EB5ED9C9-656C-44B9-B2EE-424CADE9C2A1}"/>
+                </a:ext>
+              </a:extLst>
+            </p:cNvPr>
+            <p:cNvPicPr>
+              <a:picLocks noChangeAspect="1"/>
+            </p:cNvPicPr>
+            <p:nvPr/>
+          </p:nvPicPr>
+          <p:blipFill rotWithShape="1">
+            <a:blip r:embed="rId4"/>
+            <a:srcRect r="33967" b="78168"/>
+            <a:stretch/>
+          </p:blipFill>
+          <p:spPr>
+            <a:xfrm>
+              <a:off x="937913" y="3741657"/>
+              <a:ext cx="5121287" cy="547314"/>
+            </a:xfrm>
+            <a:prstGeom prst="rect">
+              <a:avLst/>
+            </a:prstGeom>
+          </p:spPr>
+        </p:pic>
+        <p:pic>
+          <p:nvPicPr>
+            <p:cNvPr id="15" name="Picture 14">
+              <a:extLst>
+                <a:ext uri="{FF2B5EF4-FFF2-40B4-BE49-F238E27FC236}">
+                  <a16:creationId xmlns:a16="http://schemas.microsoft.com/office/drawing/2014/main" id="{7A265108-D9B0-4EB2-9B2C-D9CB8F557DB8}"/>
+                </a:ext>
+              </a:extLst>
+            </p:cNvPr>
+            <p:cNvPicPr>
+              <a:picLocks noChangeAspect="1"/>
+            </p:cNvPicPr>
+            <p:nvPr/>
+          </p:nvPicPr>
+          <p:blipFill rotWithShape="1">
+            <a:blip r:embed="rId4"/>
+            <a:srcRect l="68753" t="2026" r="227" b="16968"/>
+            <a:stretch/>
+          </p:blipFill>
+          <p:spPr>
+            <a:xfrm>
+              <a:off x="3653457" y="4284442"/>
+              <a:ext cx="2405743" cy="2030772"/>
+            </a:xfrm>
+            <a:prstGeom prst="rect">
+              <a:avLst/>
+            </a:prstGeom>
+          </p:spPr>
+        </p:pic>
+        <p:sp>
+          <p:nvSpPr>
+            <p:cNvPr id="16" name="Rectangle 15">
+              <a:extLst>
+                <a:ext uri="{FF2B5EF4-FFF2-40B4-BE49-F238E27FC236}">
+                  <a16:creationId xmlns:a16="http://schemas.microsoft.com/office/drawing/2014/main" id="{83941588-E730-4DE1-9F55-6BFF98E57E81}"/>
+                </a:ext>
+              </a:extLst>
+            </p:cNvPr>
+            <p:cNvSpPr/>
+            <p:nvPr/>
+          </p:nvSpPr>
+          <p:spPr>
+            <a:xfrm>
+              <a:off x="937913" y="4284442"/>
+              <a:ext cx="2715544" cy="2030772"/>
+            </a:xfrm>
+            <a:prstGeom prst="rect">
+              <a:avLst/>
+            </a:prstGeom>
+            <a:solidFill>
+              <a:schemeClr val="bg1"/>
+            </a:solidFill>
+            <a:ln>
+              <a:noFill/>
+            </a:ln>
+          </p:spPr>
+          <p:style>
+            <a:lnRef idx="2">
+              <a:schemeClr val="accent1">
+                <a:shade val="50000"/>
+              </a:schemeClr>
+            </a:lnRef>
+            <a:fillRef idx="1">
+              <a:schemeClr val="accent1"/>
+            </a:fillRef>
+            <a:effectRef idx="0">
+              <a:schemeClr val="accent1"/>
+            </a:effectRef>
+            <a:fontRef idx="minor">
+              <a:schemeClr val="lt1"/>
+            </a:fontRef>
+          </p:style>
+          <p:txBody>
+            <a:bodyPr rtlCol="0" anchor="ctr"/>
+            <a:lstStyle/>
+            <a:p>
+              <a:pPr algn="ctr"/>
+              <a:endParaRPr lang="en-GB"/>
+            </a:p>
+          </p:txBody>
+        </p:sp>
+        <p:sp>
+          <p:nvSpPr>
+            <p:cNvPr id="17" name="Rectangle 16">
+              <a:extLst>
+                <a:ext uri="{FF2B5EF4-FFF2-40B4-BE49-F238E27FC236}">
+                  <a16:creationId xmlns:a16="http://schemas.microsoft.com/office/drawing/2014/main" id="{A56A3043-CBCF-4046-B8C5-5B14ED5951D8}"/>
+                </a:ext>
+              </a:extLst>
+            </p:cNvPr>
+            <p:cNvSpPr/>
+            <p:nvPr/>
+          </p:nvSpPr>
+          <p:spPr>
+            <a:xfrm>
+              <a:off x="937911" y="6315214"/>
+              <a:ext cx="5121289" cy="430887"/>
+            </a:xfrm>
+            <a:prstGeom prst="rect">
+              <a:avLst/>
+            </a:prstGeom>
+          </p:spPr>
+          <p:txBody>
+            <a:bodyPr wrap="square">
+              <a:spAutoFit/>
+            </a:bodyPr>
+            <a:lstStyle/>
+            <a:p>
+              <a:r>
+                <a:rPr lang="en-GB" sz="1100" dirty="0">
+                  <a:solidFill>
+                    <a:schemeClr val="bg1">
+                      <a:lumMod val="95000"/>
+                    </a:schemeClr>
+                  </a:solidFill>
+                  <a:latin typeface="Arial Nova Light" panose="020B0304020202020204" pitchFamily="34" charset="0"/>
+                </a:rPr>
+                <a:t>https://www.fishersci.com/shop/products/NC9901158/nc9901158#?keyword=SU-8++developer</a:t>
+              </a:r>
+            </a:p>
+          </p:txBody>
+        </p:sp>
+        <p:grpSp>
+          <p:nvGrpSpPr>
+            <p:cNvPr id="21" name="Group 20">
+              <a:extLst>
+                <a:ext uri="{FF2B5EF4-FFF2-40B4-BE49-F238E27FC236}">
+                  <a16:creationId xmlns:a16="http://schemas.microsoft.com/office/drawing/2014/main" id="{056648AE-5AC7-4047-BEED-E9E4FAC2E525}"/>
+                </a:ext>
+              </a:extLst>
+            </p:cNvPr>
+            <p:cNvGrpSpPr/>
+            <p:nvPr/>
+          </p:nvGrpSpPr>
+          <p:grpSpPr>
+            <a:xfrm>
+              <a:off x="6059200" y="0"/>
+              <a:ext cx="6132800" cy="6858000"/>
+              <a:chOff x="6059200" y="0"/>
+              <a:chExt cx="6132800" cy="6858000"/>
+            </a:xfrm>
+          </p:grpSpPr>
+          <p:grpSp>
+            <p:nvGrpSpPr>
+              <p:cNvPr id="8" name="Group 7">
+                <a:extLst>
+                  <a:ext uri="{FF2B5EF4-FFF2-40B4-BE49-F238E27FC236}">
+                    <a16:creationId xmlns:a16="http://schemas.microsoft.com/office/drawing/2014/main" id="{07737474-B25F-44CB-9DBD-074F07F345C0}"/>
+                  </a:ext>
+                </a:extLst>
+              </p:cNvPr>
+              <p:cNvGrpSpPr/>
+              <p:nvPr/>
+            </p:nvGrpSpPr>
+            <p:grpSpPr>
+              <a:xfrm>
+                <a:off x="6059201" y="0"/>
+                <a:ext cx="6132799" cy="6858000"/>
+                <a:chOff x="3417753" y="868101"/>
+                <a:chExt cx="5356494" cy="5989898"/>
+              </a:xfrm>
+            </p:grpSpPr>
+            <p:pic>
+              <p:nvPicPr>
+                <p:cNvPr id="6" name="Picture 5">
+                  <a:extLst>
+                    <a:ext uri="{FF2B5EF4-FFF2-40B4-BE49-F238E27FC236}">
+                      <a16:creationId xmlns:a16="http://schemas.microsoft.com/office/drawing/2014/main" id="{DDE1D7D1-6555-42DC-A811-3A79944BD933}"/>
+                    </a:ext>
+                  </a:extLst>
+                </p:cNvPr>
+                <p:cNvPicPr>
+                  <a:picLocks noChangeAspect="1"/>
+                </p:cNvPicPr>
+                <p:nvPr/>
+              </p:nvPicPr>
+              <p:blipFill rotWithShape="1">
+                <a:blip r:embed="rId5"/>
+                <a:srcRect b="66582"/>
+                <a:stretch/>
+              </p:blipFill>
+              <p:spPr>
+                <a:xfrm>
+                  <a:off x="3417753" y="868101"/>
+                  <a:ext cx="5356494" cy="2291787"/>
+                </a:xfrm>
+                <a:prstGeom prst="rect">
+                  <a:avLst/>
+                </a:prstGeom>
+              </p:spPr>
+            </p:pic>
+            <p:pic>
+              <p:nvPicPr>
+                <p:cNvPr id="7" name="Picture 6">
+                  <a:extLst>
+                    <a:ext uri="{FF2B5EF4-FFF2-40B4-BE49-F238E27FC236}">
+                      <a16:creationId xmlns:a16="http://schemas.microsoft.com/office/drawing/2014/main" id="{46F2E62D-73E4-4AB1-9B5A-8132FBF406D9}"/>
+                    </a:ext>
+                  </a:extLst>
+                </p:cNvPr>
+                <p:cNvPicPr>
+                  <a:picLocks noChangeAspect="1"/>
+                </p:cNvPicPr>
+                <p:nvPr/>
+              </p:nvPicPr>
+              <p:blipFill rotWithShape="1">
+                <a:blip r:embed="rId5"/>
+                <a:srcRect t="46076"/>
+                <a:stretch/>
+              </p:blipFill>
+              <p:spPr>
+                <a:xfrm>
+                  <a:off x="3417753" y="3159888"/>
+                  <a:ext cx="5356494" cy="3698111"/>
+                </a:xfrm>
+                <a:prstGeom prst="rect">
+                  <a:avLst/>
+                </a:prstGeom>
+              </p:spPr>
+            </p:pic>
+          </p:grpSp>
+          <p:pic>
+            <p:nvPicPr>
+              <p:cNvPr id="19" name="Picture 18">
+                <a:extLst>
+                  <a:ext uri="{FF2B5EF4-FFF2-40B4-BE49-F238E27FC236}">
+                    <a16:creationId xmlns:a16="http://schemas.microsoft.com/office/drawing/2014/main" id="{63D0FC75-A10C-46F6-ACE7-D74E32E821C8}"/>
+                  </a:ext>
+                </a:extLst>
+              </p:cNvPr>
+              <p:cNvPicPr>
+                <a:picLocks noChangeAspect="1"/>
+              </p:cNvPicPr>
+              <p:nvPr/>
+            </p:nvPicPr>
+            <p:blipFill rotWithShape="1">
+              <a:blip r:embed="rId5">
+                <a:duotone>
+                  <a:schemeClr val="accent5">
+                    <a:shade val="45000"/>
+                    <a:satMod val="135000"/>
+                  </a:schemeClr>
+                  <a:prstClr val="white"/>
+                </a:duotone>
+              </a:blip>
+              <a:srcRect r="55013" b="81795"/>
+              <a:stretch/>
+            </p:blipFill>
+            <p:spPr>
+              <a:xfrm>
+                <a:off x="6059200" y="0"/>
+                <a:ext cx="2758979" cy="1429407"/>
+              </a:xfrm>
+              <a:prstGeom prst="rect">
+                <a:avLst/>
+              </a:prstGeom>
+            </p:spPr>
+          </p:pic>
+        </p:grpSp>
+        <p:pic>
+          <p:nvPicPr>
+            <p:cNvPr id="18" name="Picture 17">
+              <a:extLst>
+                <a:ext uri="{FF2B5EF4-FFF2-40B4-BE49-F238E27FC236}">
+                  <a16:creationId xmlns:a16="http://schemas.microsoft.com/office/drawing/2014/main" id="{483702D3-18F1-4152-876C-A5441D9C0A45}"/>
+                </a:ext>
+              </a:extLst>
+            </p:cNvPr>
+            <p:cNvPicPr>
+              <a:picLocks noChangeAspect="1"/>
+            </p:cNvPicPr>
+            <p:nvPr/>
+          </p:nvPicPr>
+          <p:blipFill rotWithShape="1">
+            <a:blip r:embed="rId6"/>
+            <a:srcRect t="29532" r="70051"/>
+            <a:stretch/>
+          </p:blipFill>
+          <p:spPr>
+            <a:xfrm>
+              <a:off x="6059196" y="0"/>
+              <a:ext cx="6132799" cy="1500579"/>
+            </a:xfrm>
+            <a:prstGeom prst="rect">
+              <a:avLst/>
+            </a:prstGeom>
+          </p:spPr>
+        </p:pic>
+        <p:pic>
+          <p:nvPicPr>
+            <p:cNvPr id="2" name="Picture 1">
+              <a:extLst>
+                <a:ext uri="{FF2B5EF4-FFF2-40B4-BE49-F238E27FC236}">
+                  <a16:creationId xmlns:a16="http://schemas.microsoft.com/office/drawing/2014/main" id="{A9975785-50E5-4EB4-8722-5F801FE25197}"/>
+                </a:ext>
+              </a:extLst>
+            </p:cNvPr>
+            <p:cNvPicPr>
+              <a:picLocks noChangeAspect="1"/>
+            </p:cNvPicPr>
+            <p:nvPr/>
+          </p:nvPicPr>
+          <p:blipFill>
+            <a:blip r:embed="rId6"/>
+            <a:stretch>
+              <a:fillRect/>
+            </a:stretch>
+          </p:blipFill>
+          <p:spPr>
+            <a:xfrm>
+              <a:off x="6059197" y="524151"/>
+              <a:ext cx="6132798" cy="884025"/>
+            </a:xfrm>
+            <a:prstGeom prst="rect">
+              <a:avLst/>
+            </a:prstGeom>
+          </p:spPr>
+        </p:pic>
+      </p:grpSp>
+    </p:spTree>
+    <p:extLst>
+      <p:ext uri="{BB962C8B-B14F-4D97-AF65-F5344CB8AC3E}">
+        <p14:creationId xmlns:p14="http://schemas.microsoft.com/office/powerpoint/2010/main" val="252399005"/>
+      </p:ext>
+    </p:extLst>
+  </p:cSld>
+  <p:clrMapOvr>
+    <a:masterClrMapping/>
+  </p:clrMapOvr>
+</p:sld>
+</file>
+
 <file path=ppt/slides/slide2.xml><?xml version="1.0" encoding="utf-8"?>
 <p:sld xmlns:a="http://schemas.openxmlformats.org/drawingml/2006/main" xmlns:r="http://schemas.openxmlformats.org/officeDocument/2006/relationships" xmlns:p="http://schemas.openxmlformats.org/presentationml/2006/main">
   <p:cSld>
@@ -6617,14 +7282,55 @@
         </p:blipFill>
         <p:spPr>
           <a:xfrm>
-            <a:off x="2921936" y="3075683"/>
-            <a:ext cx="7297168" cy="3324689"/>
+            <a:off x="3199509" y="2601709"/>
+            <a:ext cx="7247774" cy="3302184"/>
           </a:xfrm>
           <a:prstGeom prst="rect">
             <a:avLst/>
           </a:prstGeom>
         </p:spPr>
       </p:pic>
+      <p:sp>
+        <p:nvSpPr>
+          <p:cNvPr id="2" name="Rectangle 1">
+            <a:extLst>
+              <a:ext uri="{FF2B5EF4-FFF2-40B4-BE49-F238E27FC236}">
+                <a16:creationId xmlns:a16="http://schemas.microsoft.com/office/drawing/2014/main" id="{AFB49A8D-AAB0-4E9E-809B-88B2C9015A89}"/>
+              </a:ext>
+            </a:extLst>
+          </p:cNvPr>
+          <p:cNvSpPr/>
+          <p:nvPr/>
+        </p:nvSpPr>
+        <p:spPr>
+          <a:xfrm>
+            <a:off x="949040" y="5903893"/>
+            <a:ext cx="11242960" cy="954107"/>
+          </a:xfrm>
+          <a:prstGeom prst="rect">
+            <a:avLst/>
+          </a:prstGeom>
+        </p:spPr>
+        <p:txBody>
+          <a:bodyPr wrap="square">
+            <a:spAutoFit/>
+          </a:bodyPr>
+          <a:lstStyle/>
+          <a:p>
+            <a:r>
+              <a:rPr lang="en-GB" sz="2800" dirty="0">
+                <a:solidFill>
+                  <a:schemeClr val="bg1">
+                    <a:lumMod val="95000"/>
+                  </a:schemeClr>
+                </a:solidFill>
+                <a:latin typeface="Arial Nova Light" panose="020B0304020202020204" pitchFamily="34" charset="0"/>
+              </a:rPr>
+              <a:t>No studies (until now) have experimentally and theoretically assessed how nano-rods or micro/nano-wires transform upon carbonization.</a:t>
+            </a:r>
+          </a:p>
+        </p:txBody>
+      </p:sp>
     </p:spTree>
     <p:extLst>
       <p:ext uri="{BB962C8B-B14F-4D97-AF65-F5344CB8AC3E}">

</xml_diff>

<commit_message>
nano tec presentation plus review paper progress
</commit_message>
<xml_diff>
--- a/Shared_A01212611/Slides/GroupMeeting004_Pyrolysis_induced_shrinking.pptx
+++ b/Shared_A01212611/Slides/GroupMeeting004_Pyrolysis_induced_shrinking.pptx
@@ -456,92 +456,6 @@
     </pc:docChg>
   </pc:docChgLst>
   <pc:docChgLst>
-    <pc:chgData name="Antonio Osamu Katagiri Tanaka" userId="2c28225e-d492-4964-8551-1b0a3c65dda0" providerId="ADAL" clId="{C59DF1F7-432E-4893-B28C-5D3B004F8374}"/>
-    <pc:docChg chg="undo redo custSel addSld delSld modSld sldOrd delSection modSection">
-      <pc:chgData name="Antonio Osamu Katagiri Tanaka" userId="2c28225e-d492-4964-8551-1b0a3c65dda0" providerId="ADAL" clId="{C59DF1F7-432E-4893-B28C-5D3B004F8374}" dt="2019-03-31T14:59:20.878" v="389" actId="20577"/>
-      <pc:docMkLst>
-        <pc:docMk/>
-      </pc:docMkLst>
-      <pc:sldChg chg="modSp">
-        <pc:chgData name="Antonio Osamu Katagiri Tanaka" userId="2c28225e-d492-4964-8551-1b0a3c65dda0" providerId="ADAL" clId="{C59DF1F7-432E-4893-B28C-5D3B004F8374}" dt="2019-03-30T15:24:08.167" v="64" actId="1440"/>
-        <pc:sldMkLst>
-          <pc:docMk/>
-          <pc:sldMk cId="4056039362" sldId="260"/>
-        </pc:sldMkLst>
-        <pc:picChg chg="mod">
-          <ac:chgData name="Antonio Osamu Katagiri Tanaka" userId="2c28225e-d492-4964-8551-1b0a3c65dda0" providerId="ADAL" clId="{C59DF1F7-432E-4893-B28C-5D3B004F8374}" dt="2019-03-30T15:24:08.167" v="64" actId="1440"/>
-          <ac:picMkLst>
-            <pc:docMk/>
-            <pc:sldMk cId="4056039362" sldId="260"/>
-            <ac:picMk id="13" creationId="{8578D0BD-CD2C-44B1-976E-1029D186D2DF}"/>
-          </ac:picMkLst>
-        </pc:picChg>
-      </pc:sldChg>
-      <pc:sldChg chg="ord">
-        <pc:chgData name="Antonio Osamu Katagiri Tanaka" userId="2c28225e-d492-4964-8551-1b0a3c65dda0" providerId="ADAL" clId="{C59DF1F7-432E-4893-B28C-5D3B004F8374}" dt="2019-03-30T14:49:00.456" v="1"/>
-        <pc:sldMkLst>
-          <pc:docMk/>
-          <pc:sldMk cId="3604131991" sldId="263"/>
-        </pc:sldMkLst>
-      </pc:sldChg>
-      <pc:sldChg chg="addSp delSp modSp add">
-        <pc:chgData name="Antonio Osamu Katagiri Tanaka" userId="2c28225e-d492-4964-8551-1b0a3c65dda0" providerId="ADAL" clId="{C59DF1F7-432E-4893-B28C-5D3B004F8374}" dt="2019-03-30T15:01:17.755" v="32"/>
-        <pc:sldMkLst>
-          <pc:docMk/>
-          <pc:sldMk cId="4246728971" sldId="269"/>
-        </pc:sldMkLst>
-        <pc:spChg chg="add del mod">
-          <ac:chgData name="Antonio Osamu Katagiri Tanaka" userId="2c28225e-d492-4964-8551-1b0a3c65dda0" providerId="ADAL" clId="{C59DF1F7-432E-4893-B28C-5D3B004F8374}" dt="2019-03-30T14:52:53.260" v="6" actId="478"/>
-          <ac:spMkLst>
-            <pc:docMk/>
-            <pc:sldMk cId="4246728971" sldId="269"/>
-            <ac:spMk id="3" creationId="{BFCEFFC5-7335-4486-8818-2B397870E222}"/>
-          </ac:spMkLst>
-        </pc:spChg>
-        <pc:spChg chg="del">
-          <ac:chgData name="Antonio Osamu Katagiri Tanaka" userId="2c28225e-d492-4964-8551-1b0a3c65dda0" providerId="ADAL" clId="{C59DF1F7-432E-4893-B28C-5D3B004F8374}" dt="2019-03-30T14:52:51.721" v="5" actId="478"/>
-          <ac:spMkLst>
-            <pc:docMk/>
-            <pc:sldMk cId="4246728971" sldId="269"/>
-            <ac:spMk id="4" creationId="{F9ED8BE6-F7AC-4FD8-8FA8-8C683A7C2F62}"/>
-          </ac:spMkLst>
-        </pc:spChg>
-        <pc:spChg chg="del">
-          <ac:chgData name="Antonio Osamu Katagiri Tanaka" userId="2c28225e-d492-4964-8551-1b0a3c65dda0" providerId="ADAL" clId="{C59DF1F7-432E-4893-B28C-5D3B004F8374}" dt="2019-03-30T14:52:55.923" v="7" actId="478"/>
-          <ac:spMkLst>
-            <pc:docMk/>
-            <pc:sldMk cId="4246728971" sldId="269"/>
-            <ac:spMk id="6" creationId="{058630E6-31AF-4451-B084-C9809D0DA4E8}"/>
-          </ac:spMkLst>
-        </pc:spChg>
-        <pc:spChg chg="add del mod">
-          <ac:chgData name="Antonio Osamu Katagiri Tanaka" userId="2c28225e-d492-4964-8551-1b0a3c65dda0" providerId="ADAL" clId="{C59DF1F7-432E-4893-B28C-5D3B004F8374}" dt="2019-03-30T14:52:58.396" v="8" actId="478"/>
-          <ac:spMkLst>
-            <pc:docMk/>
-            <pc:sldMk cId="4246728971" sldId="269"/>
-            <ac:spMk id="7" creationId="{EFB1FD18-9FB8-4EC8-A186-B4E23A6745CA}"/>
-          </ac:spMkLst>
-        </pc:spChg>
-        <pc:spChg chg="add mod">
-          <ac:chgData name="Antonio Osamu Katagiri Tanaka" userId="2c28225e-d492-4964-8551-1b0a3c65dda0" providerId="ADAL" clId="{C59DF1F7-432E-4893-B28C-5D3B004F8374}" dt="2019-03-30T14:57:55.916" v="28" actId="403"/>
-          <ac:spMkLst>
-            <pc:docMk/>
-            <pc:sldMk cId="4246728971" sldId="269"/>
-            <ac:spMk id="9" creationId="{907DD878-B76C-4FC5-9BC3-86C7C3DB3BDA}"/>
-          </ac:spMkLst>
-        </pc:spChg>
-        <pc:picChg chg="add mod">
-          <ac:chgData name="Antonio Osamu Katagiri Tanaka" userId="2c28225e-d492-4964-8551-1b0a3c65dda0" providerId="ADAL" clId="{C59DF1F7-432E-4893-B28C-5D3B004F8374}" dt="2019-03-30T15:01:17.755" v="32"/>
-          <ac:picMkLst>
-            <pc:docMk/>
-            <pc:sldMk cId="4246728971" sldId="269"/>
-            <ac:picMk id="1026" creationId="{62C86081-2859-45C8-BAE6-D2CC488FFFF6}"/>
-          </ac:picMkLst>
-        </pc:picChg>
-      </pc:sldChg>
-    </pc:docChg>
-  </pc:docChgLst>
-  <pc:docChgLst>
     <pc:chgData name="Antonio Osamu Katagiri Tanaka" userId="2c28225e-d492-4964-8551-1b0a3c65dda0" providerId="ADAL" clId="{E8966260-3096-4054-A5E0-0A91A10A6CF4}"/>
     <pc:docChg chg="custSel delSld modSld modSection">
       <pc:chgData name="Antonio Osamu Katagiri Tanaka" userId="2c28225e-d492-4964-8551-1b0a3c65dda0" providerId="ADAL" clId="{E8966260-3096-4054-A5E0-0A91A10A6CF4}" dt="2019-05-05T18:21:47.650" v="183" actId="1076"/>
@@ -799,6 +713,92 @@
     </pc:docChg>
   </pc:docChgLst>
   <pc:docChgLst>
+    <pc:chgData name="Antonio Osamu Katagiri Tanaka" userId="2c28225e-d492-4964-8551-1b0a3c65dda0" providerId="ADAL" clId="{C59DF1F7-432E-4893-B28C-5D3B004F8374}"/>
+    <pc:docChg chg="undo redo custSel addSld delSld modSld sldOrd delSection modSection">
+      <pc:chgData name="Antonio Osamu Katagiri Tanaka" userId="2c28225e-d492-4964-8551-1b0a3c65dda0" providerId="ADAL" clId="{C59DF1F7-432E-4893-B28C-5D3B004F8374}" dt="2019-03-31T14:59:20.878" v="389" actId="20577"/>
+      <pc:docMkLst>
+        <pc:docMk/>
+      </pc:docMkLst>
+      <pc:sldChg chg="modSp">
+        <pc:chgData name="Antonio Osamu Katagiri Tanaka" userId="2c28225e-d492-4964-8551-1b0a3c65dda0" providerId="ADAL" clId="{C59DF1F7-432E-4893-B28C-5D3B004F8374}" dt="2019-03-30T15:24:08.167" v="64" actId="1440"/>
+        <pc:sldMkLst>
+          <pc:docMk/>
+          <pc:sldMk cId="4056039362" sldId="260"/>
+        </pc:sldMkLst>
+        <pc:picChg chg="mod">
+          <ac:chgData name="Antonio Osamu Katagiri Tanaka" userId="2c28225e-d492-4964-8551-1b0a3c65dda0" providerId="ADAL" clId="{C59DF1F7-432E-4893-B28C-5D3B004F8374}" dt="2019-03-30T15:24:08.167" v="64" actId="1440"/>
+          <ac:picMkLst>
+            <pc:docMk/>
+            <pc:sldMk cId="4056039362" sldId="260"/>
+            <ac:picMk id="13" creationId="{8578D0BD-CD2C-44B1-976E-1029D186D2DF}"/>
+          </ac:picMkLst>
+        </pc:picChg>
+      </pc:sldChg>
+      <pc:sldChg chg="ord">
+        <pc:chgData name="Antonio Osamu Katagiri Tanaka" userId="2c28225e-d492-4964-8551-1b0a3c65dda0" providerId="ADAL" clId="{C59DF1F7-432E-4893-B28C-5D3B004F8374}" dt="2019-03-30T14:49:00.456" v="1"/>
+        <pc:sldMkLst>
+          <pc:docMk/>
+          <pc:sldMk cId="3604131991" sldId="263"/>
+        </pc:sldMkLst>
+      </pc:sldChg>
+      <pc:sldChg chg="addSp delSp modSp add">
+        <pc:chgData name="Antonio Osamu Katagiri Tanaka" userId="2c28225e-d492-4964-8551-1b0a3c65dda0" providerId="ADAL" clId="{C59DF1F7-432E-4893-B28C-5D3B004F8374}" dt="2019-03-30T15:01:17.755" v="32"/>
+        <pc:sldMkLst>
+          <pc:docMk/>
+          <pc:sldMk cId="4246728971" sldId="269"/>
+        </pc:sldMkLst>
+        <pc:spChg chg="add del mod">
+          <ac:chgData name="Antonio Osamu Katagiri Tanaka" userId="2c28225e-d492-4964-8551-1b0a3c65dda0" providerId="ADAL" clId="{C59DF1F7-432E-4893-B28C-5D3B004F8374}" dt="2019-03-30T14:52:53.260" v="6" actId="478"/>
+          <ac:spMkLst>
+            <pc:docMk/>
+            <pc:sldMk cId="4246728971" sldId="269"/>
+            <ac:spMk id="3" creationId="{BFCEFFC5-7335-4486-8818-2B397870E222}"/>
+          </ac:spMkLst>
+        </pc:spChg>
+        <pc:spChg chg="del">
+          <ac:chgData name="Antonio Osamu Katagiri Tanaka" userId="2c28225e-d492-4964-8551-1b0a3c65dda0" providerId="ADAL" clId="{C59DF1F7-432E-4893-B28C-5D3B004F8374}" dt="2019-03-30T14:52:51.721" v="5" actId="478"/>
+          <ac:spMkLst>
+            <pc:docMk/>
+            <pc:sldMk cId="4246728971" sldId="269"/>
+            <ac:spMk id="4" creationId="{F9ED8BE6-F7AC-4FD8-8FA8-8C683A7C2F62}"/>
+          </ac:spMkLst>
+        </pc:spChg>
+        <pc:spChg chg="del">
+          <ac:chgData name="Antonio Osamu Katagiri Tanaka" userId="2c28225e-d492-4964-8551-1b0a3c65dda0" providerId="ADAL" clId="{C59DF1F7-432E-4893-B28C-5D3B004F8374}" dt="2019-03-30T14:52:55.923" v="7" actId="478"/>
+          <ac:spMkLst>
+            <pc:docMk/>
+            <pc:sldMk cId="4246728971" sldId="269"/>
+            <ac:spMk id="6" creationId="{058630E6-31AF-4451-B084-C9809D0DA4E8}"/>
+          </ac:spMkLst>
+        </pc:spChg>
+        <pc:spChg chg="add del mod">
+          <ac:chgData name="Antonio Osamu Katagiri Tanaka" userId="2c28225e-d492-4964-8551-1b0a3c65dda0" providerId="ADAL" clId="{C59DF1F7-432E-4893-B28C-5D3B004F8374}" dt="2019-03-30T14:52:58.396" v="8" actId="478"/>
+          <ac:spMkLst>
+            <pc:docMk/>
+            <pc:sldMk cId="4246728971" sldId="269"/>
+            <ac:spMk id="7" creationId="{EFB1FD18-9FB8-4EC8-A186-B4E23A6745CA}"/>
+          </ac:spMkLst>
+        </pc:spChg>
+        <pc:spChg chg="add mod">
+          <ac:chgData name="Antonio Osamu Katagiri Tanaka" userId="2c28225e-d492-4964-8551-1b0a3c65dda0" providerId="ADAL" clId="{C59DF1F7-432E-4893-B28C-5D3B004F8374}" dt="2019-03-30T14:57:55.916" v="28" actId="403"/>
+          <ac:spMkLst>
+            <pc:docMk/>
+            <pc:sldMk cId="4246728971" sldId="269"/>
+            <ac:spMk id="9" creationId="{907DD878-B76C-4FC5-9BC3-86C7C3DB3BDA}"/>
+          </ac:spMkLst>
+        </pc:spChg>
+        <pc:picChg chg="add mod">
+          <ac:chgData name="Antonio Osamu Katagiri Tanaka" userId="2c28225e-d492-4964-8551-1b0a3c65dda0" providerId="ADAL" clId="{C59DF1F7-432E-4893-B28C-5D3B004F8374}" dt="2019-03-30T15:01:17.755" v="32"/>
+          <ac:picMkLst>
+            <pc:docMk/>
+            <pc:sldMk cId="4246728971" sldId="269"/>
+            <ac:picMk id="1026" creationId="{62C86081-2859-45C8-BAE6-D2CC488FFFF6}"/>
+          </ac:picMkLst>
+        </pc:picChg>
+      </pc:sldChg>
+    </pc:docChg>
+  </pc:docChgLst>
+  <pc:docChgLst>
     <pc:chgData name="Antonio Osamu Katagiri Tanaka" userId="2c28225e-d492-4964-8551-1b0a3c65dda0" providerId="ADAL" clId="{BA091A27-582A-4D6D-8346-D5CF8624059C}"/>
     <pc:docChg chg="undo custSel addSld delSld modSld sldOrd">
       <pc:chgData name="Antonio Osamu Katagiri Tanaka" userId="2c28225e-d492-4964-8551-1b0a3c65dda0" providerId="ADAL" clId="{BA091A27-582A-4D6D-8346-D5CF8624059C}" dt="2019-03-29T18:11:35.461" v="1535" actId="20577"/>
@@ -1095,7 +1095,7 @@
           <a:p>
             <a:fld id="{1B402B64-CAC4-4D07-834F-F232921309C8}" type="datetimeFigureOut">
               <a:rPr lang="en-GB" smtClean="0"/>
-              <a:t>03/10/2019</a:t>
+              <a:t>09/10/2019</a:t>
             </a:fld>
             <a:endParaRPr lang="en-GB"/>
           </a:p>
@@ -2723,7 +2723,7 @@
           <a:p>
             <a:fld id="{D884633D-11AC-4888-94B9-297E606567D1}" type="datetimeFigureOut">
               <a:rPr lang="en-GB" smtClean="0"/>
-              <a:t>03/10/2019</a:t>
+              <a:t>09/10/2019</a:t>
             </a:fld>
             <a:endParaRPr lang="en-GB"/>
           </a:p>
@@ -2923,7 +2923,7 @@
           <a:p>
             <a:fld id="{D884633D-11AC-4888-94B9-297E606567D1}" type="datetimeFigureOut">
               <a:rPr lang="en-GB" smtClean="0"/>
-              <a:t>03/10/2019</a:t>
+              <a:t>09/10/2019</a:t>
             </a:fld>
             <a:endParaRPr lang="en-GB"/>
           </a:p>
@@ -3133,7 +3133,7 @@
           <a:p>
             <a:fld id="{D884633D-11AC-4888-94B9-297E606567D1}" type="datetimeFigureOut">
               <a:rPr lang="en-GB" smtClean="0"/>
-              <a:t>03/10/2019</a:t>
+              <a:t>09/10/2019</a:t>
             </a:fld>
             <a:endParaRPr lang="en-GB"/>
           </a:p>
@@ -3333,7 +3333,7 @@
           <a:p>
             <a:fld id="{D884633D-11AC-4888-94B9-297E606567D1}" type="datetimeFigureOut">
               <a:rPr lang="en-GB" smtClean="0"/>
-              <a:t>03/10/2019</a:t>
+              <a:t>09/10/2019</a:t>
             </a:fld>
             <a:endParaRPr lang="en-GB"/>
           </a:p>
@@ -3609,7 +3609,7 @@
           <a:p>
             <a:fld id="{D884633D-11AC-4888-94B9-297E606567D1}" type="datetimeFigureOut">
               <a:rPr lang="en-GB" smtClean="0"/>
-              <a:t>03/10/2019</a:t>
+              <a:t>09/10/2019</a:t>
             </a:fld>
             <a:endParaRPr lang="en-GB"/>
           </a:p>
@@ -3877,7 +3877,7 @@
           <a:p>
             <a:fld id="{D884633D-11AC-4888-94B9-297E606567D1}" type="datetimeFigureOut">
               <a:rPr lang="en-GB" smtClean="0"/>
-              <a:t>03/10/2019</a:t>
+              <a:t>09/10/2019</a:t>
             </a:fld>
             <a:endParaRPr lang="en-GB"/>
           </a:p>
@@ -4292,7 +4292,7 @@
           <a:p>
             <a:fld id="{D884633D-11AC-4888-94B9-297E606567D1}" type="datetimeFigureOut">
               <a:rPr lang="en-GB" smtClean="0"/>
-              <a:t>03/10/2019</a:t>
+              <a:t>09/10/2019</a:t>
             </a:fld>
             <a:endParaRPr lang="en-GB"/>
           </a:p>
@@ -4434,7 +4434,7 @@
           <a:p>
             <a:fld id="{D884633D-11AC-4888-94B9-297E606567D1}" type="datetimeFigureOut">
               <a:rPr lang="en-GB" smtClean="0"/>
-              <a:t>03/10/2019</a:t>
+              <a:t>09/10/2019</a:t>
             </a:fld>
             <a:endParaRPr lang="en-GB"/>
           </a:p>
@@ -4547,7 +4547,7 @@
           <a:p>
             <a:fld id="{D884633D-11AC-4888-94B9-297E606567D1}" type="datetimeFigureOut">
               <a:rPr lang="en-GB" smtClean="0"/>
-              <a:t>03/10/2019</a:t>
+              <a:t>09/10/2019</a:t>
             </a:fld>
             <a:endParaRPr lang="en-GB"/>
           </a:p>
@@ -4860,7 +4860,7 @@
           <a:p>
             <a:fld id="{D884633D-11AC-4888-94B9-297E606567D1}" type="datetimeFigureOut">
               <a:rPr lang="en-GB" smtClean="0"/>
-              <a:t>03/10/2019</a:t>
+              <a:t>09/10/2019</a:t>
             </a:fld>
             <a:endParaRPr lang="en-GB"/>
           </a:p>
@@ -5149,7 +5149,7 @@
           <a:p>
             <a:fld id="{D884633D-11AC-4888-94B9-297E606567D1}" type="datetimeFigureOut">
               <a:rPr lang="en-GB" smtClean="0"/>
-              <a:t>03/10/2019</a:t>
+              <a:t>09/10/2019</a:t>
             </a:fld>
             <a:endParaRPr lang="en-GB"/>
           </a:p>
@@ -5401,7 +5401,7 @@
           <a:p>
             <a:fld id="{D884633D-11AC-4888-94B9-297E606567D1}" type="datetimeFigureOut">
               <a:rPr lang="en-GB" smtClean="0"/>
-              <a:t>03/10/2019</a:t>
+              <a:t>09/10/2019</a:t>
             </a:fld>
             <a:endParaRPr lang="en-GB"/>
           </a:p>
@@ -6160,7 +6160,7 @@
           </a:p>
           <a:p>
             <a:r>
-              <a:rPr lang="en-GB" dirty="0">
+              <a:rPr lang="en-GB">
                 <a:solidFill>
                   <a:schemeClr val="bg1">
                     <a:lumMod val="95000"/>
@@ -6168,7 +6168,18 @@
                 </a:solidFill>
                 <a:latin typeface="Arial Nova Light" panose="020B0604020202020204" pitchFamily="34" charset="0"/>
               </a:rPr>
-              <a:t>03 Oct 2019</a:t>
+              <a:t>09 </a:t>
+            </a:r>
+            <a:r>
+              <a:rPr lang="en-GB" dirty="0">
+                <a:solidFill>
+                  <a:schemeClr val="bg1">
+                    <a:lumMod val="95000"/>
+                  </a:schemeClr>
+                </a:solidFill>
+                <a:latin typeface="Arial Nova Light" panose="020B0604020202020204" pitchFamily="34" charset="0"/>
+              </a:rPr>
+              <a:t>Oct 2019</a:t>
             </a:r>
           </a:p>
         </p:txBody>

</xml_diff>